<commit_message>
Update presentation with light colors
</commit_message>
<xml_diff>
--- a/SearchKeywordPerformance_Presentation.pptx
+++ b/SearchKeywordPerformance_Presentation.pptx
@@ -3104,13 +3104,13 @@
         <p:spPr>
           <a:xfrm>
             <a:off x="0" y="0"/>
-            <a:ext cx="9144000" cy="1828800"/>
+            <a:ext cx="9144000" cy="2286000"/>
           </a:xfrm>
           <a:prstGeom prst="rect">
             <a:avLst/>
           </a:prstGeom>
           <a:solidFill>
-            <a:srgbClr val="ED1C24"/>
+            <a:srgbClr val="4A90D9"/>
           </a:solidFill>
           <a:ln>
             <a:noFill/>
@@ -3146,7 +3146,7 @@
         </p:nvSpPr>
         <p:spPr>
           <a:xfrm>
-            <a:off x="457200" y="457200"/>
+            <a:off x="457200" y="640080"/>
             <a:ext cx="8229600" cy="914400"/>
           </a:xfrm>
           <a:prstGeom prst="rect">
@@ -3181,7 +3181,7 @@
         </p:nvSpPr>
         <p:spPr>
           <a:xfrm>
-            <a:off x="457200" y="1188720"/>
+            <a:off x="457200" y="1463040"/>
             <a:ext cx="8229600" cy="457200"/>
           </a:xfrm>
           <a:prstGeom prst="rect">
@@ -3235,13 +3235,13 @@
         <p:spPr>
           <a:xfrm>
             <a:off x="0" y="0"/>
-            <a:ext cx="9144000" cy="1097280"/>
+            <a:ext cx="9144000" cy="1188720"/>
           </a:xfrm>
           <a:prstGeom prst="rect">
             <a:avLst/>
           </a:prstGeom>
           <a:solidFill>
-            <a:srgbClr val="ED1C24"/>
+            <a:srgbClr val="4A90D9"/>
           </a:solidFill>
           <a:ln>
             <a:noFill/>
@@ -3277,7 +3277,7 @@
         </p:nvSpPr>
         <p:spPr>
           <a:xfrm>
-            <a:off x="457200" y="274320"/>
+            <a:off x="457200" y="320040"/>
             <a:ext cx="8229600" cy="731520"/>
           </a:xfrm>
           <a:prstGeom prst="rect">
@@ -3312,7 +3312,7 @@
         </p:nvSpPr>
         <p:spPr>
           <a:xfrm>
-            <a:off x="457200" y="1371600"/>
+            <a:off x="457200" y="1463040"/>
             <a:ext cx="8229600" cy="4572000"/>
           </a:xfrm>
           <a:prstGeom prst="rect">
@@ -3486,13 +3486,13 @@
         <p:spPr>
           <a:xfrm>
             <a:off x="0" y="0"/>
-            <a:ext cx="9144000" cy="1097280"/>
+            <a:ext cx="9144000" cy="1188720"/>
           </a:xfrm>
           <a:prstGeom prst="rect">
             <a:avLst/>
           </a:prstGeom>
           <a:solidFill>
-            <a:srgbClr val="ED1C24"/>
+            <a:srgbClr val="4A90D9"/>
           </a:solidFill>
           <a:ln>
             <a:noFill/>
@@ -3528,7 +3528,7 @@
         </p:nvSpPr>
         <p:spPr>
           <a:xfrm>
-            <a:off x="457200" y="274320"/>
+            <a:off x="457200" y="320040"/>
             <a:ext cx="8229600" cy="731520"/>
           </a:xfrm>
           <a:prstGeom prst="rect">
@@ -3563,7 +3563,7 @@
         </p:nvSpPr>
         <p:spPr>
           <a:xfrm>
-            <a:off x="457200" y="1371600"/>
+            <a:off x="457200" y="1463040"/>
             <a:ext cx="8229600" cy="4572000"/>
           </a:xfrm>
           <a:prstGeom prst="rect">
@@ -3749,13 +3749,13 @@
         <p:spPr>
           <a:xfrm>
             <a:off x="0" y="0"/>
-            <a:ext cx="9144000" cy="1097280"/>
+            <a:ext cx="9144000" cy="1188720"/>
           </a:xfrm>
           <a:prstGeom prst="rect">
             <a:avLst/>
           </a:prstGeom>
           <a:solidFill>
-            <a:srgbClr val="ED1C24"/>
+            <a:srgbClr val="4A90D9"/>
           </a:solidFill>
           <a:ln>
             <a:noFill/>
@@ -3791,7 +3791,7 @@
         </p:nvSpPr>
         <p:spPr>
           <a:xfrm>
-            <a:off x="457200" y="274320"/>
+            <a:off x="457200" y="320040"/>
             <a:ext cx="8229600" cy="731520"/>
           </a:xfrm>
           <a:prstGeom prst="rect">
@@ -3827,7 +3827,7 @@
           <p:nvPr/>
         </p:nvGraphicFramePr>
         <p:xfrm>
-          <a:off x="457200" y="1463040"/>
+          <a:off x="457200" y="1554480"/>
           <a:ext cx="8229600" cy="2286000"/>
         </p:xfrm>
         <a:graphic>
@@ -3862,7 +3862,7 @@
                   </a:txBody>
                   <a:tcPr>
                     <a:solidFill>
-                      <a:srgbClr val="ED1C24"/>
+                      <a:srgbClr val="4A90D9"/>
                     </a:solidFill>
                   </a:tcPr>
                 </a:tc>
@@ -3885,7 +3885,7 @@
                   </a:txBody>
                   <a:tcPr>
                     <a:solidFill>
-                      <a:srgbClr val="ED1C24"/>
+                      <a:srgbClr val="4A90D9"/>
                     </a:solidFill>
                   </a:tcPr>
                 </a:tc>
@@ -3908,7 +3908,7 @@
                   </a:txBody>
                   <a:tcPr>
                     <a:solidFill>
-                      <a:srgbClr val="ED1C24"/>
+                      <a:srgbClr val="4A90D9"/>
                     </a:solidFill>
                   </a:tcPr>
                 </a:tc>
@@ -3931,7 +3931,7 @@
                   </a:txBody>
                   <a:tcPr>
                     <a:solidFill>
-                      <a:srgbClr val="ED1C24"/>
+                      <a:srgbClr val="4A90D9"/>
                     </a:solidFill>
                   </a:tcPr>
                 </a:tc>
@@ -3950,7 +3950,11 @@
                       </a:r>
                     </a:p>
                   </a:txBody>
-                  <a:tcPr/>
+                  <a:tcPr>
+                    <a:solidFill>
+                      <a:srgbClr val="F0F0F0"/>
+                    </a:solidFill>
+                  </a:tcPr>
                 </a:tc>
                 <a:tc>
                   <a:txBody>
@@ -3965,7 +3969,11 @@
                       </a:r>
                     </a:p>
                   </a:txBody>
-                  <a:tcPr/>
+                  <a:tcPr>
+                    <a:solidFill>
+                      <a:srgbClr val="F0F0F0"/>
+                    </a:solidFill>
+                  </a:tcPr>
                 </a:tc>
                 <a:tc>
                   <a:txBody>
@@ -3980,7 +3988,11 @@
                       </a:r>
                     </a:p>
                   </a:txBody>
-                  <a:tcPr/>
+                  <a:tcPr>
+                    <a:solidFill>
+                      <a:srgbClr val="F0F0F0"/>
+                    </a:solidFill>
+                  </a:tcPr>
                 </a:tc>
                 <a:tc>
                   <a:txBody>
@@ -3995,7 +4007,11 @@
                       </a:r>
                     </a:p>
                   </a:txBody>
-                  <a:tcPr/>
+                  <a:tcPr>
+                    <a:solidFill>
+                      <a:srgbClr val="F0F0F0"/>
+                    </a:solidFill>
+                  </a:tcPr>
                 </a:tc>
               </a:tr>
               <a:tr h="571500">
@@ -4012,7 +4028,11 @@
                       </a:r>
                     </a:p>
                   </a:txBody>
-                  <a:tcPr/>
+                  <a:tcPr>
+                    <a:solidFill>
+                      <a:srgbClr val="F0F0F0"/>
+                    </a:solidFill>
+                  </a:tcPr>
                 </a:tc>
                 <a:tc>
                   <a:txBody>
@@ -4027,7 +4047,11 @@
                       </a:r>
                     </a:p>
                   </a:txBody>
-                  <a:tcPr/>
+                  <a:tcPr>
+                    <a:solidFill>
+                      <a:srgbClr val="F0F0F0"/>
+                    </a:solidFill>
+                  </a:tcPr>
                 </a:tc>
                 <a:tc>
                   <a:txBody>
@@ -4042,7 +4066,11 @@
                       </a:r>
                     </a:p>
                   </a:txBody>
-                  <a:tcPr/>
+                  <a:tcPr>
+                    <a:solidFill>
+                      <a:srgbClr val="F0F0F0"/>
+                    </a:solidFill>
+                  </a:tcPr>
                 </a:tc>
                 <a:tc>
                   <a:txBody>
@@ -4057,7 +4085,11 @@
                       </a:r>
                     </a:p>
                   </a:txBody>
-                  <a:tcPr/>
+                  <a:tcPr>
+                    <a:solidFill>
+                      <a:srgbClr val="F0F0F0"/>
+                    </a:solidFill>
+                  </a:tcPr>
                 </a:tc>
               </a:tr>
               <a:tr h="571500">
@@ -4074,7 +4106,11 @@
                       </a:r>
                     </a:p>
                   </a:txBody>
-                  <a:tcPr/>
+                  <a:tcPr>
+                    <a:solidFill>
+                      <a:srgbClr val="F0F0F0"/>
+                    </a:solidFill>
+                  </a:tcPr>
                 </a:tc>
                 <a:tc>
                   <a:txBody>
@@ -4089,7 +4125,11 @@
                       </a:r>
                     </a:p>
                   </a:txBody>
-                  <a:tcPr/>
+                  <a:tcPr>
+                    <a:solidFill>
+                      <a:srgbClr val="F0F0F0"/>
+                    </a:solidFill>
+                  </a:tcPr>
                 </a:tc>
                 <a:tc>
                   <a:txBody>
@@ -4104,7 +4144,11 @@
                       </a:r>
                     </a:p>
                   </a:txBody>
-                  <a:tcPr/>
+                  <a:tcPr>
+                    <a:solidFill>
+                      <a:srgbClr val="F0F0F0"/>
+                    </a:solidFill>
+                  </a:tcPr>
                 </a:tc>
                 <a:tc>
                   <a:txBody>
@@ -4119,7 +4163,11 @@
                       </a:r>
                     </a:p>
                   </a:txBody>
-                  <a:tcPr/>
+                  <a:tcPr>
+                    <a:solidFill>
+                      <a:srgbClr val="F0F0F0"/>
+                    </a:solidFill>
+                  </a:tcPr>
                 </a:tc>
               </a:tr>
             </a:tbl>
@@ -4134,7 +4182,7 @@
         </p:nvSpPr>
         <p:spPr>
           <a:xfrm>
-            <a:off x="457200" y="3931920"/>
+            <a:off x="457200" y="4023360"/>
             <a:ext cx="8229600" cy="1371600"/>
           </a:xfrm>
           <a:prstGeom prst="rect">
@@ -4151,7 +4199,7 @@
             <a:pPr>
               <a:defRPr sz="2200" b="1">
                 <a:solidFill>
-                  <a:srgbClr val="ED1C24"/>
+                  <a:srgbClr val="5CB85C"/>
                 </a:solidFill>
               </a:defRPr>
             </a:pPr>
@@ -4204,13 +4252,13 @@
         <p:spPr>
           <a:xfrm>
             <a:off x="0" y="0"/>
-            <a:ext cx="9144000" cy="1097280"/>
+            <a:ext cx="9144000" cy="1188720"/>
           </a:xfrm>
           <a:prstGeom prst="rect">
             <a:avLst/>
           </a:prstGeom>
           <a:solidFill>
-            <a:srgbClr val="ED1C24"/>
+            <a:srgbClr val="4A90D9"/>
           </a:solidFill>
           <a:ln>
             <a:noFill/>
@@ -4246,7 +4294,7 @@
         </p:nvSpPr>
         <p:spPr>
           <a:xfrm>
-            <a:off x="457200" y="274320"/>
+            <a:off x="457200" y="320040"/>
             <a:ext cx="8229600" cy="731520"/>
           </a:xfrm>
           <a:prstGeom prst="rect">
@@ -4281,14 +4329,14 @@
         </p:nvSpPr>
         <p:spPr>
           <a:xfrm>
-            <a:off x="274320" y="1645920"/>
+            <a:off x="274320" y="1737360"/>
             <a:ext cx="1828800" cy="1097280"/>
           </a:xfrm>
           <a:prstGeom prst="roundRect">
             <a:avLst/>
           </a:prstGeom>
           <a:solidFill>
-            <a:srgbClr val="333333"/>
+            <a:srgbClr val="4A90D9"/>
           </a:solidFill>
           <a:ln>
             <a:noFill/>
@@ -4337,14 +4385,14 @@
         </p:nvSpPr>
         <p:spPr>
           <a:xfrm>
-            <a:off x="2560320" y="1645920"/>
+            <a:off x="2560320" y="1737360"/>
             <a:ext cx="1828800" cy="1097280"/>
           </a:xfrm>
           <a:prstGeom prst="roundRect">
             <a:avLst/>
           </a:prstGeom>
           <a:solidFill>
-            <a:srgbClr val="333333"/>
+            <a:srgbClr val="5CB85C"/>
           </a:solidFill>
           <a:ln>
             <a:noFill/>
@@ -4393,14 +4441,14 @@
         </p:nvSpPr>
         <p:spPr>
           <a:xfrm>
-            <a:off x="4846320" y="1645920"/>
+            <a:off x="4846320" y="1737360"/>
             <a:ext cx="1828800" cy="1097280"/>
           </a:xfrm>
           <a:prstGeom prst="roundRect">
             <a:avLst/>
           </a:prstGeom>
           <a:solidFill>
-            <a:srgbClr val="ED1C24"/>
+            <a:srgbClr val="F5A623"/>
           </a:solidFill>
           <a:ln>
             <a:noFill/>
@@ -4449,14 +4497,14 @@
         </p:nvSpPr>
         <p:spPr>
           <a:xfrm>
-            <a:off x="7132320" y="1645920"/>
+            <a:off x="7132320" y="1737360"/>
             <a:ext cx="1828800" cy="1097280"/>
           </a:xfrm>
           <a:prstGeom prst="roundRect">
             <a:avLst/>
           </a:prstGeom>
           <a:solidFill>
-            <a:srgbClr val="ED1C24"/>
+            <a:srgbClr val="F5A623"/>
           </a:solidFill>
           <a:ln>
             <a:noFill/>
@@ -4505,7 +4553,7 @@
         </p:nvSpPr>
         <p:spPr>
           <a:xfrm>
-            <a:off x="2103120" y="2011680"/>
+            <a:off x="2103120" y="2103120"/>
             <a:ext cx="457200" cy="457200"/>
           </a:xfrm>
           <a:prstGeom prst="rect">
@@ -4520,7 +4568,11 @@
           <a:lstStyle/>
           <a:p>
             <a:pPr>
-              <a:defRPr sz="2800" b="1"/>
+              <a:defRPr sz="2800" b="1">
+                <a:solidFill>
+                  <a:srgbClr val="333333"/>
+                </a:solidFill>
+              </a:defRPr>
             </a:pPr>
             <a:r>
               <a:t>→</a:t>
@@ -4536,7 +4588,7 @@
         </p:nvSpPr>
         <p:spPr>
           <a:xfrm>
-            <a:off x="4389120" y="2011680"/>
+            <a:off x="4389120" y="2103120"/>
             <a:ext cx="457200" cy="457200"/>
           </a:xfrm>
           <a:prstGeom prst="rect">
@@ -4551,7 +4603,11 @@
           <a:lstStyle/>
           <a:p>
             <a:pPr>
-              <a:defRPr sz="2800" b="1"/>
+              <a:defRPr sz="2800" b="1">
+                <a:solidFill>
+                  <a:srgbClr val="333333"/>
+                </a:solidFill>
+              </a:defRPr>
             </a:pPr>
             <a:r>
               <a:t>→</a:t>
@@ -4567,7 +4623,7 @@
         </p:nvSpPr>
         <p:spPr>
           <a:xfrm>
-            <a:off x="6675120" y="2011680"/>
+            <a:off x="6675120" y="2103120"/>
             <a:ext cx="457200" cy="457200"/>
           </a:xfrm>
           <a:prstGeom prst="rect">
@@ -4582,7 +4638,11 @@
           <a:lstStyle/>
           <a:p>
             <a:pPr>
-              <a:defRPr sz="2800" b="1"/>
+              <a:defRPr sz="2800" b="1">
+                <a:solidFill>
+                  <a:srgbClr val="333333"/>
+                </a:solidFill>
+              </a:defRPr>
             </a:pPr>
             <a:r>
               <a:t>→</a:t>
@@ -4615,7 +4675,7 @@
             <a:pPr>
               <a:defRPr b="1" sz="2200">
                 <a:solidFill>
-                  <a:srgbClr val="333333"/>
+                  <a:srgbClr val="5CB85C"/>
                 </a:solidFill>
               </a:defRPr>
             </a:pPr>
@@ -4712,13 +4772,13 @@
         <p:spPr>
           <a:xfrm>
             <a:off x="0" y="0"/>
-            <a:ext cx="9144000" cy="1097280"/>
+            <a:ext cx="9144000" cy="1188720"/>
           </a:xfrm>
           <a:prstGeom prst="rect">
             <a:avLst/>
           </a:prstGeom>
           <a:solidFill>
-            <a:srgbClr val="ED1C24"/>
+            <a:srgbClr val="4A90D9"/>
           </a:solidFill>
           <a:ln>
             <a:noFill/>
@@ -4754,7 +4814,7 @@
         </p:nvSpPr>
         <p:spPr>
           <a:xfrm>
-            <a:off x="457200" y="274320"/>
+            <a:off x="457200" y="320040"/>
             <a:ext cx="8229600" cy="731520"/>
           </a:xfrm>
           <a:prstGeom prst="rect">
@@ -4824,7 +4884,7 @@
                   </a:txBody>
                   <a:tcPr>
                     <a:solidFill>
-                      <a:srgbClr val="ED1C24"/>
+                      <a:srgbClr val="4A90D9"/>
                     </a:solidFill>
                   </a:tcPr>
                 </a:tc>
@@ -4847,7 +4907,7 @@
                   </a:txBody>
                   <a:tcPr>
                     <a:solidFill>
-                      <a:srgbClr val="ED1C24"/>
+                      <a:srgbClr val="4A90D9"/>
                     </a:solidFill>
                   </a:tcPr>
                 </a:tc>
@@ -4870,7 +4930,7 @@
                   </a:txBody>
                   <a:tcPr>
                     <a:solidFill>
-                      <a:srgbClr val="ED1C24"/>
+                      <a:srgbClr val="4A90D9"/>
                     </a:solidFill>
                   </a:tcPr>
                 </a:tc>
@@ -4889,7 +4949,11 @@
                       </a:r>
                     </a:p>
                   </a:txBody>
-                  <a:tcPr/>
+                  <a:tcPr>
+                    <a:solidFill>
+                      <a:srgbClr val="F0F0F0"/>
+                    </a:solidFill>
+                  </a:tcPr>
                 </a:tc>
                 <a:tc>
                   <a:txBody>
@@ -4904,7 +4968,11 @@
                       </a:r>
                     </a:p>
                   </a:txBody>
-                  <a:tcPr/>
+                  <a:tcPr>
+                    <a:solidFill>
+                      <a:srgbClr val="F0F0F0"/>
+                    </a:solidFill>
+                  </a:tcPr>
                 </a:tc>
                 <a:tc>
                   <a:txBody>
@@ -4919,7 +4987,11 @@
                       </a:r>
                     </a:p>
                   </a:txBody>
-                  <a:tcPr/>
+                  <a:tcPr>
+                    <a:solidFill>
+                      <a:srgbClr val="F0F0F0"/>
+                    </a:solidFill>
+                  </a:tcPr>
                 </a:tc>
               </a:tr>
               <a:tr h="502920">
@@ -4936,7 +5008,11 @@
                       </a:r>
                     </a:p>
                   </a:txBody>
-                  <a:tcPr/>
+                  <a:tcPr>
+                    <a:solidFill>
+                      <a:srgbClr val="F0F0F0"/>
+                    </a:solidFill>
+                  </a:tcPr>
                 </a:tc>
                 <a:tc>
                   <a:txBody>
@@ -4951,7 +5027,11 @@
                       </a:r>
                     </a:p>
                   </a:txBody>
-                  <a:tcPr/>
+                  <a:tcPr>
+                    <a:solidFill>
+                      <a:srgbClr val="F0F0F0"/>
+                    </a:solidFill>
+                  </a:tcPr>
                 </a:tc>
                 <a:tc>
                   <a:txBody>
@@ -4966,7 +5046,11 @@
                       </a:r>
                     </a:p>
                   </a:txBody>
-                  <a:tcPr/>
+                  <a:tcPr>
+                    <a:solidFill>
+                      <a:srgbClr val="F0F0F0"/>
+                    </a:solidFill>
+                  </a:tcPr>
                 </a:tc>
               </a:tr>
               <a:tr h="502920">
@@ -4980,7 +5064,11 @@
                       </a:pPr>
                     </a:p>
                   </a:txBody>
-                  <a:tcPr/>
+                  <a:tcPr>
+                    <a:solidFill>
+                      <a:srgbClr val="E8F5E9"/>
+                    </a:solidFill>
+                  </a:tcPr>
                 </a:tc>
                 <a:tc>
                   <a:txBody>
@@ -4995,7 +5083,11 @@
                       </a:r>
                     </a:p>
                   </a:txBody>
-                  <a:tcPr/>
+                  <a:tcPr>
+                    <a:solidFill>
+                      <a:srgbClr val="E8F5E9"/>
+                    </a:solidFill>
+                  </a:tcPr>
                 </a:tc>
                 <a:tc>
                   <a:txBody>
@@ -5010,7 +5102,11 @@
                       </a:r>
                     </a:p>
                   </a:txBody>
-                  <a:tcPr/>
+                  <a:tcPr>
+                    <a:solidFill>
+                      <a:srgbClr val="E8F5E9"/>
+                    </a:solidFill>
+                  </a:tcPr>
                 </a:tc>
               </a:tr>
             </a:tbl>
@@ -5054,7 +5150,7 @@
             <a:pPr>
               <a:defRPr sz="1800">
                 <a:solidFill>
-                  <a:srgbClr val="333333"/>
+                  <a:srgbClr val="5CB85C"/>
                 </a:solidFill>
               </a:defRPr>
             </a:pPr>
@@ -5091,13 +5187,13 @@
         <p:spPr>
           <a:xfrm>
             <a:off x="0" y="0"/>
-            <a:ext cx="9144000" cy="1097280"/>
+            <a:ext cx="9144000" cy="1188720"/>
           </a:xfrm>
           <a:prstGeom prst="rect">
             <a:avLst/>
           </a:prstGeom>
           <a:solidFill>
-            <a:srgbClr val="ED1C24"/>
+            <a:srgbClr val="4A90D9"/>
           </a:solidFill>
           <a:ln>
             <a:noFill/>
@@ -5133,7 +5229,7 @@
         </p:nvSpPr>
         <p:spPr>
           <a:xfrm>
-            <a:off x="457200" y="274320"/>
+            <a:off x="457200" y="320040"/>
             <a:ext cx="8229600" cy="731520"/>
           </a:xfrm>
           <a:prstGeom prst="rect">
@@ -5168,7 +5264,7 @@
         </p:nvSpPr>
         <p:spPr>
           <a:xfrm>
-            <a:off x="457200" y="1371600"/>
+            <a:off x="457200" y="1463040"/>
             <a:ext cx="8229600" cy="4572000"/>
           </a:xfrm>
           <a:prstGeom prst="rect">
@@ -5342,13 +5438,13 @@
         <p:spPr>
           <a:xfrm>
             <a:off x="0" y="0"/>
-            <a:ext cx="9144000" cy="1828800"/>
+            <a:ext cx="9144000" cy="2286000"/>
           </a:xfrm>
           <a:prstGeom prst="rect">
             <a:avLst/>
           </a:prstGeom>
           <a:solidFill>
-            <a:srgbClr val="ED1C24"/>
+            <a:srgbClr val="4A90D9"/>
           </a:solidFill>
           <a:ln>
             <a:noFill/>
@@ -5384,7 +5480,7 @@
         </p:nvSpPr>
         <p:spPr>
           <a:xfrm>
-            <a:off x="457200" y="457200"/>
+            <a:off x="457200" y="640080"/>
             <a:ext cx="8229600" cy="914400"/>
           </a:xfrm>
           <a:prstGeom prst="rect">
@@ -5419,7 +5515,7 @@
         </p:nvSpPr>
         <p:spPr>
           <a:xfrm>
-            <a:off x="457200" y="1188720"/>
+            <a:off x="457200" y="1463040"/>
             <a:ext cx="8229600" cy="457200"/>
           </a:xfrm>
           <a:prstGeom prst="rect">

</xml_diff>